<commit_message>
add lect 4 nd 5 python
</commit_message>
<xml_diff>
--- a/Python/powerpoint resources/Python facts and memes.pptx
+++ b/Python/powerpoint resources/Python facts and memes.pptx
@@ -7,6 +7,8 @@
   <p:sldIdLst>
     <p:sldId id="256" r:id="rId2"/>
     <p:sldId id="257" r:id="rId3"/>
+    <p:sldId id="258" r:id="rId4"/>
+    <p:sldId id="259" r:id="rId5"/>
   </p:sldIdLst>
   <p:sldSz cx="12192000" cy="6858000"/>
   <p:notesSz cx="6858000" cy="9144000"/>
@@ -105,6 +107,11 @@
       </a:defRPr>
     </a:lvl9pPr>
   </p:defaultTextStyle>
+  <p:extLst>
+    <p:ext uri="{EFAFB233-063F-42B5-8137-9DF3F51BA10A}">
+      <p15:sldGuideLst xmlns:p15="http://schemas.microsoft.com/office/powerpoint/2012/main"/>
+    </p:ext>
+  </p:extLst>
 </p:presentation>
 </file>
 
@@ -294,7 +301,7 @@
           <a:p>
             <a:fld id="{21C3DA2F-1200-4536-AA7B-24FE770184C7}" type="datetimeFigureOut">
               <a:rPr lang="en-US" smtClean="0"/>
-              <a:t>4/13/2024</a:t>
+              <a:t>4/16/2024</a:t>
             </a:fld>
             <a:endParaRPr lang="en-US"/>
           </a:p>
@@ -569,7 +576,7 @@
           <a:p>
             <a:fld id="{21C3DA2F-1200-4536-AA7B-24FE770184C7}" type="datetimeFigureOut">
               <a:rPr lang="en-US" smtClean="0"/>
-              <a:t>4/13/2024</a:t>
+              <a:t>4/16/2024</a:t>
             </a:fld>
             <a:endParaRPr lang="en-US"/>
           </a:p>
@@ -763,7 +770,7 @@
           <a:p>
             <a:fld id="{21C3DA2F-1200-4536-AA7B-24FE770184C7}" type="datetimeFigureOut">
               <a:rPr lang="en-US" smtClean="0"/>
-              <a:t>4/13/2024</a:t>
+              <a:t>4/16/2024</a:t>
             </a:fld>
             <a:endParaRPr lang="en-US"/>
           </a:p>
@@ -1036,7 +1043,7 @@
           <a:p>
             <a:fld id="{21C3DA2F-1200-4536-AA7B-24FE770184C7}" type="datetimeFigureOut">
               <a:rPr lang="en-US" smtClean="0"/>
-              <a:t>4/13/2024</a:t>
+              <a:t>4/16/2024</a:t>
             </a:fld>
             <a:endParaRPr lang="en-US"/>
           </a:p>
@@ -1377,7 +1384,7 @@
           <a:p>
             <a:fld id="{21C3DA2F-1200-4536-AA7B-24FE770184C7}" type="datetimeFigureOut">
               <a:rPr lang="en-US" smtClean="0"/>
-              <a:t>4/13/2024</a:t>
+              <a:t>4/16/2024</a:t>
             </a:fld>
             <a:endParaRPr lang="en-US"/>
           </a:p>
@@ -2000,7 +2007,7 @@
           <a:p>
             <a:fld id="{21C3DA2F-1200-4536-AA7B-24FE770184C7}" type="datetimeFigureOut">
               <a:rPr lang="en-US" smtClean="0"/>
-              <a:t>4/13/2024</a:t>
+              <a:t>4/16/2024</a:t>
             </a:fld>
             <a:endParaRPr lang="en-US"/>
           </a:p>
@@ -2860,7 +2867,7 @@
           <a:p>
             <a:fld id="{21C3DA2F-1200-4536-AA7B-24FE770184C7}" type="datetimeFigureOut">
               <a:rPr lang="en-US" smtClean="0"/>
-              <a:t>4/13/2024</a:t>
+              <a:t>4/16/2024</a:t>
             </a:fld>
             <a:endParaRPr lang="en-US"/>
           </a:p>
@@ -3030,7 +3037,7 @@
           <a:p>
             <a:fld id="{21C3DA2F-1200-4536-AA7B-24FE770184C7}" type="datetimeFigureOut">
               <a:rPr lang="en-US" smtClean="0"/>
-              <a:t>4/13/2024</a:t>
+              <a:t>4/16/2024</a:t>
             </a:fld>
             <a:endParaRPr lang="en-US"/>
           </a:p>
@@ -3210,7 +3217,7 @@
           <a:p>
             <a:fld id="{21C3DA2F-1200-4536-AA7B-24FE770184C7}" type="datetimeFigureOut">
               <a:rPr lang="en-US" smtClean="0"/>
-              <a:t>4/13/2024</a:t>
+              <a:t>4/16/2024</a:t>
             </a:fld>
             <a:endParaRPr lang="en-US"/>
           </a:p>
@@ -3380,7 +3387,7 @@
           <a:p>
             <a:fld id="{21C3DA2F-1200-4536-AA7B-24FE770184C7}" type="datetimeFigureOut">
               <a:rPr lang="en-US" smtClean="0"/>
-              <a:t>4/13/2024</a:t>
+              <a:t>4/16/2024</a:t>
             </a:fld>
             <a:endParaRPr lang="en-US"/>
           </a:p>
@@ -3627,7 +3634,7 @@
           <a:p>
             <a:fld id="{21C3DA2F-1200-4536-AA7B-24FE770184C7}" type="datetimeFigureOut">
               <a:rPr lang="en-US" smtClean="0"/>
-              <a:t>4/13/2024</a:t>
+              <a:t>4/16/2024</a:t>
             </a:fld>
             <a:endParaRPr lang="en-US"/>
           </a:p>
@@ -3919,7 +3926,7 @@
           <a:p>
             <a:fld id="{21C3DA2F-1200-4536-AA7B-24FE770184C7}" type="datetimeFigureOut">
               <a:rPr lang="en-US" smtClean="0"/>
-              <a:t>4/13/2024</a:t>
+              <a:t>4/16/2024</a:t>
             </a:fld>
             <a:endParaRPr lang="en-US"/>
           </a:p>
@@ -4363,7 +4370,7 @@
           <a:p>
             <a:fld id="{21C3DA2F-1200-4536-AA7B-24FE770184C7}" type="datetimeFigureOut">
               <a:rPr lang="en-US" smtClean="0"/>
-              <a:t>4/13/2024</a:t>
+              <a:t>4/16/2024</a:t>
             </a:fld>
             <a:endParaRPr lang="en-US"/>
           </a:p>
@@ -4481,7 +4488,7 @@
           <a:p>
             <a:fld id="{21C3DA2F-1200-4536-AA7B-24FE770184C7}" type="datetimeFigureOut">
               <a:rPr lang="en-US" smtClean="0"/>
-              <a:t>4/13/2024</a:t>
+              <a:t>4/16/2024</a:t>
             </a:fld>
             <a:endParaRPr lang="en-US"/>
           </a:p>
@@ -4576,7 +4583,7 @@
           <a:p>
             <a:fld id="{21C3DA2F-1200-4536-AA7B-24FE770184C7}" type="datetimeFigureOut">
               <a:rPr lang="en-US" smtClean="0"/>
-              <a:t>4/13/2024</a:t>
+              <a:t>4/16/2024</a:t>
             </a:fld>
             <a:endParaRPr lang="en-US"/>
           </a:p>
@@ -4855,7 +4862,7 @@
           <a:p>
             <a:fld id="{21C3DA2F-1200-4536-AA7B-24FE770184C7}" type="datetimeFigureOut">
               <a:rPr lang="en-US" smtClean="0"/>
-              <a:t>4/13/2024</a:t>
+              <a:t>4/16/2024</a:t>
             </a:fld>
             <a:endParaRPr lang="en-US"/>
           </a:p>
@@ -5130,7 +5137,7 @@
           <a:p>
             <a:fld id="{21C3DA2F-1200-4536-AA7B-24FE770184C7}" type="datetimeFigureOut">
               <a:rPr lang="en-US" smtClean="0"/>
-              <a:t>4/13/2024</a:t>
+              <a:t>4/16/2024</a:t>
             </a:fld>
             <a:endParaRPr lang="en-US"/>
           </a:p>
@@ -5559,7 +5566,7 @@
           <a:p>
             <a:fld id="{21C3DA2F-1200-4536-AA7B-24FE770184C7}" type="datetimeFigureOut">
               <a:rPr lang="en-US" smtClean="0"/>
-              <a:t>4/13/2024</a:t>
+              <a:t>4/16/2024</a:t>
             </a:fld>
             <a:endParaRPr lang="en-US"/>
           </a:p>
@@ -6435,6 +6442,503 @@
 </p:sld>
 </file>
 
+<file path=ppt/slides/slide3.xml><?xml version="1.0" encoding="utf-8"?>
+<p:sld xmlns:a="http://schemas.openxmlformats.org/drawingml/2006/main" xmlns:r="http://schemas.openxmlformats.org/officeDocument/2006/relationships" xmlns:p="http://schemas.openxmlformats.org/presentationml/2006/main">
+  <p:cSld>
+    <p:spTree>
+      <p:nvGrpSpPr>
+        <p:cNvPr id="1" name=""/>
+        <p:cNvGrpSpPr/>
+        <p:nvPr/>
+      </p:nvGrpSpPr>
+      <p:grpSpPr>
+        <a:xfrm>
+          <a:off x="0" y="0"/>
+          <a:ext cx="0" cy="0"/>
+          <a:chOff x="0" y="0"/>
+          <a:chExt cx="0" cy="0"/>
+        </a:xfrm>
+      </p:grpSpPr>
+      <p:pic>
+        <p:nvPicPr>
+          <p:cNvPr id="1026" name="Picture 2" descr="How Memes can help you learn Python | by Susanne van ...">
+            <a:extLst>
+              <a:ext uri="{FF2B5EF4-FFF2-40B4-BE49-F238E27FC236}">
+                <a16:creationId xmlns:a16="http://schemas.microsoft.com/office/drawing/2014/main" id="{EACBFA42-3430-4FC7-8813-ECB213A0EBF5}"/>
+              </a:ext>
+            </a:extLst>
+          </p:cNvPr>
+          <p:cNvPicPr>
+            <a:picLocks noChangeAspect="1" noChangeArrowheads="1"/>
+          </p:cNvPicPr>
+          <p:nvPr/>
+        </p:nvPicPr>
+        <p:blipFill>
+          <a:blip r:embed="rId2">
+            <a:extLst>
+              <a:ext uri="{28A0092B-C50C-407E-A947-70E740481C1C}">
+                <a14:useLocalDpi xmlns:a14="http://schemas.microsoft.com/office/drawing/2010/main" val="0"/>
+              </a:ext>
+            </a:extLst>
+          </a:blip>
+          <a:srcRect/>
+          <a:stretch>
+            <a:fillRect/>
+          </a:stretch>
+        </p:blipFill>
+        <p:spPr bwMode="auto">
+          <a:xfrm>
+            <a:off x="3078480" y="79553"/>
+            <a:ext cx="6050280" cy="6715811"/>
+          </a:xfrm>
+          <a:prstGeom prst="rect">
+            <a:avLst/>
+          </a:prstGeom>
+          <a:noFill/>
+          <a:extLst>
+            <a:ext uri="{909E8E84-426E-40DD-AFC4-6F175D3DCCD1}">
+              <a14:hiddenFill xmlns:a14="http://schemas.microsoft.com/office/drawing/2010/main">
+                <a:solidFill>
+                  <a:srgbClr val="FFFFFF"/>
+                </a:solidFill>
+              </a14:hiddenFill>
+            </a:ext>
+          </a:extLst>
+        </p:spPr>
+      </p:pic>
+    </p:spTree>
+    <p:extLst>
+      <p:ext uri="{BB962C8B-B14F-4D97-AF65-F5344CB8AC3E}">
+        <p14:creationId xmlns:p14="http://schemas.microsoft.com/office/powerpoint/2010/main" val="1317411884"/>
+      </p:ext>
+    </p:extLst>
+  </p:cSld>
+  <p:clrMapOvr>
+    <a:masterClrMapping/>
+  </p:clrMapOvr>
+</p:sld>
+</file>
+
+<file path=ppt/slides/slide4.xml><?xml version="1.0" encoding="utf-8"?>
+<p:sld xmlns:a="http://schemas.openxmlformats.org/drawingml/2006/main" xmlns:r="http://schemas.openxmlformats.org/officeDocument/2006/relationships" xmlns:p="http://schemas.openxmlformats.org/presentationml/2006/main">
+  <p:cSld>
+    <p:spTree>
+      <p:nvGrpSpPr>
+        <p:cNvPr id="1" name=""/>
+        <p:cNvGrpSpPr/>
+        <p:nvPr/>
+      </p:nvGrpSpPr>
+      <p:grpSpPr>
+        <a:xfrm>
+          <a:off x="0" y="0"/>
+          <a:ext cx="0" cy="0"/>
+          <a:chOff x="0" y="0"/>
+          <a:chExt cx="0" cy="0"/>
+        </a:xfrm>
+      </p:grpSpPr>
+      <p:sp>
+        <p:nvSpPr>
+          <p:cNvPr id="7" name="Rectangle 6">
+            <a:extLst>
+              <a:ext uri="{FF2B5EF4-FFF2-40B4-BE49-F238E27FC236}">
+                <a16:creationId xmlns:a16="http://schemas.microsoft.com/office/drawing/2014/main" id="{62E623E8-5E4D-4AFE-A5AB-37441C38B0D2}"/>
+              </a:ext>
+            </a:extLst>
+          </p:cNvPr>
+          <p:cNvSpPr/>
+          <p:nvPr/>
+        </p:nvSpPr>
+        <p:spPr>
+          <a:xfrm>
+            <a:off x="3567546" y="424552"/>
+            <a:ext cx="4480715" cy="923330"/>
+          </a:xfrm>
+          <a:prstGeom prst="rect">
+            <a:avLst/>
+          </a:prstGeom>
+          <a:noFill/>
+        </p:spPr>
+        <p:txBody>
+          <a:bodyPr wrap="none" lIns="91440" tIns="45720" rIns="91440" bIns="45720">
+            <a:spAutoFit/>
+          </a:bodyPr>
+          <a:lstStyle/>
+          <a:p>
+            <a:pPr algn="ctr"/>
+            <a:r>
+              <a:rPr lang="en-US" sz="5400" b="1" cap="none" spc="0" dirty="0">
+                <a:ln w="9525">
+                  <a:solidFill>
+                    <a:schemeClr val="bg1"/>
+                  </a:solidFill>
+                  <a:prstDash val="solid"/>
+                </a:ln>
+                <a:solidFill>
+                  <a:schemeClr val="tx1"/>
+                </a:solidFill>
+                <a:effectLst>
+                  <a:outerShdw blurRad="12700" dist="38100" dir="2700000" algn="tl" rotWithShape="0">
+                    <a:schemeClr val="bg1">
+                      <a:lumMod val="50000"/>
+                    </a:schemeClr>
+                  </a:outerShdw>
+                </a:effectLst>
+              </a:rPr>
+              <a:t>Python Fact!!</a:t>
+            </a:r>
+          </a:p>
+        </p:txBody>
+      </p:sp>
+      <p:sp>
+        <p:nvSpPr>
+          <p:cNvPr id="8" name="Rectangle 7">
+            <a:extLst>
+              <a:ext uri="{FF2B5EF4-FFF2-40B4-BE49-F238E27FC236}">
+                <a16:creationId xmlns:a16="http://schemas.microsoft.com/office/drawing/2014/main" id="{1B639886-16A6-45CD-9B06-0B82E2D78A12}"/>
+              </a:ext>
+            </a:extLst>
+          </p:cNvPr>
+          <p:cNvSpPr/>
+          <p:nvPr/>
+        </p:nvSpPr>
+        <p:spPr>
+          <a:xfrm>
+            <a:off x="2311951" y="1651188"/>
+            <a:ext cx="7568097" cy="4524315"/>
+          </a:xfrm>
+          <a:prstGeom prst="rect">
+            <a:avLst/>
+          </a:prstGeom>
+          <a:noFill/>
+        </p:spPr>
+        <p:txBody>
+          <a:bodyPr wrap="square" lIns="91440" tIns="45720" rIns="91440" bIns="45720">
+            <a:spAutoFit/>
+          </a:bodyPr>
+          <a:lstStyle/>
+          <a:p>
+            <a:pPr algn="ctr"/>
+            <a:r>
+              <a:rPr lang="en-US" sz="3200" b="1" dirty="0">
+                <a:ln w="9525">
+                  <a:solidFill>
+                    <a:schemeClr val="bg1"/>
+                  </a:solidFill>
+                  <a:prstDash val="solid"/>
+                </a:ln>
+                <a:effectLst>
+                  <a:outerShdw blurRad="12700" dist="38100" dir="2700000" algn="tl" rotWithShape="0">
+                    <a:schemeClr val="bg1">
+                      <a:lumMod val="50000"/>
+                    </a:schemeClr>
+                  </a:outerShdw>
+                </a:effectLst>
+              </a:rPr>
+              <a:t>Python has different Variant:</a:t>
+            </a:r>
+          </a:p>
+          <a:p>
+            <a:pPr algn="ctr"/>
+            <a:r>
+              <a:rPr lang="en-US" sz="3200" b="1" dirty="0">
+                <a:ln w="9525">
+                  <a:solidFill>
+                    <a:schemeClr val="bg1"/>
+                  </a:solidFill>
+                  <a:prstDash val="solid"/>
+                </a:ln>
+                <a:effectLst>
+                  <a:outerShdw blurRad="12700" dist="38100" dir="2700000" algn="tl" rotWithShape="0">
+                    <a:schemeClr val="bg1">
+                      <a:lumMod val="50000"/>
+                    </a:schemeClr>
+                  </a:outerShdw>
+                </a:effectLst>
+              </a:rPr>
+              <a:t> </a:t>
+            </a:r>
+          </a:p>
+          <a:p>
+            <a:pPr marL="514350" indent="-514350">
+              <a:buAutoNum type="arabicPeriod"/>
+            </a:pPr>
+            <a:r>
+              <a:rPr lang="en-US" sz="3200" b="1" dirty="0" err="1">
+                <a:ln w="9525">
+                  <a:solidFill>
+                    <a:schemeClr val="bg1"/>
+                  </a:solidFill>
+                  <a:prstDash val="solid"/>
+                </a:ln>
+                <a:effectLst>
+                  <a:outerShdw blurRad="12700" dist="38100" dir="2700000" algn="tl" rotWithShape="0">
+                    <a:schemeClr val="bg1">
+                      <a:lumMod val="50000"/>
+                    </a:schemeClr>
+                  </a:outerShdw>
+                </a:effectLst>
+              </a:rPr>
+              <a:t>CPython</a:t>
+            </a:r>
+            <a:endParaRPr lang="en-US" sz="3200" b="1" dirty="0">
+              <a:ln w="9525">
+                <a:solidFill>
+                  <a:schemeClr val="bg1"/>
+                </a:solidFill>
+                <a:prstDash val="solid"/>
+              </a:ln>
+              <a:effectLst>
+                <a:outerShdw blurRad="12700" dist="38100" dir="2700000" algn="tl" rotWithShape="0">
+                  <a:schemeClr val="bg1">
+                    <a:lumMod val="50000"/>
+                  </a:schemeClr>
+                </a:outerShdw>
+              </a:effectLst>
+            </a:endParaRPr>
+          </a:p>
+          <a:p>
+            <a:pPr marL="514350" indent="-514350">
+              <a:buAutoNum type="arabicPeriod"/>
+            </a:pPr>
+            <a:r>
+              <a:rPr lang="en-US" sz="3200" b="1" dirty="0" err="1">
+                <a:ln w="9525">
+                  <a:solidFill>
+                    <a:schemeClr val="bg1"/>
+                  </a:solidFill>
+                  <a:prstDash val="solid"/>
+                </a:ln>
+                <a:effectLst>
+                  <a:outerShdw blurRad="12700" dist="38100" dir="2700000" algn="tl" rotWithShape="0">
+                    <a:schemeClr val="bg1">
+                      <a:lumMod val="50000"/>
+                    </a:schemeClr>
+                  </a:outerShdw>
+                </a:effectLst>
+              </a:rPr>
+              <a:t>Jython</a:t>
+            </a:r>
+            <a:endParaRPr lang="en-US" sz="3200" b="1" dirty="0">
+              <a:ln w="9525">
+                <a:solidFill>
+                  <a:schemeClr val="bg1"/>
+                </a:solidFill>
+                <a:prstDash val="solid"/>
+              </a:ln>
+              <a:effectLst>
+                <a:outerShdw blurRad="12700" dist="38100" dir="2700000" algn="tl" rotWithShape="0">
+                  <a:schemeClr val="bg1">
+                    <a:lumMod val="50000"/>
+                  </a:schemeClr>
+                </a:outerShdw>
+              </a:effectLst>
+            </a:endParaRPr>
+          </a:p>
+          <a:p>
+            <a:pPr marL="514350" indent="-514350">
+              <a:buAutoNum type="arabicPeriod"/>
+            </a:pPr>
+            <a:r>
+              <a:rPr lang="en-US" sz="3200" b="1" dirty="0" err="1">
+                <a:ln w="9525">
+                  <a:solidFill>
+                    <a:schemeClr val="bg1"/>
+                  </a:solidFill>
+                  <a:prstDash val="solid"/>
+                </a:ln>
+                <a:effectLst>
+                  <a:outerShdw blurRad="12700" dist="38100" dir="2700000" algn="tl" rotWithShape="0">
+                    <a:schemeClr val="bg1">
+                      <a:lumMod val="50000"/>
+                    </a:schemeClr>
+                  </a:outerShdw>
+                </a:effectLst>
+              </a:rPr>
+              <a:t>IronPython</a:t>
+            </a:r>
+            <a:endParaRPr lang="en-US" sz="3200" b="1" dirty="0">
+              <a:ln w="9525">
+                <a:solidFill>
+                  <a:schemeClr val="bg1"/>
+                </a:solidFill>
+                <a:prstDash val="solid"/>
+              </a:ln>
+              <a:effectLst>
+                <a:outerShdw blurRad="12700" dist="38100" dir="2700000" algn="tl" rotWithShape="0">
+                  <a:schemeClr val="bg1">
+                    <a:lumMod val="50000"/>
+                  </a:schemeClr>
+                </a:outerShdw>
+              </a:effectLst>
+            </a:endParaRPr>
+          </a:p>
+          <a:p>
+            <a:pPr marL="514350" indent="-514350">
+              <a:buAutoNum type="arabicPeriod"/>
+            </a:pPr>
+            <a:r>
+              <a:rPr lang="en-US" sz="3200" b="1" dirty="0" err="1">
+                <a:ln w="9525">
+                  <a:solidFill>
+                    <a:schemeClr val="bg1"/>
+                  </a:solidFill>
+                  <a:prstDash val="solid"/>
+                </a:ln>
+                <a:effectLst>
+                  <a:outerShdw blurRad="12700" dist="38100" dir="2700000" algn="tl" rotWithShape="0">
+                    <a:schemeClr val="bg1">
+                      <a:lumMod val="50000"/>
+                    </a:schemeClr>
+                  </a:outerShdw>
+                </a:effectLst>
+              </a:rPr>
+              <a:t>Brython</a:t>
+            </a:r>
+            <a:endParaRPr lang="en-US" sz="3200" b="1" dirty="0">
+              <a:ln w="9525">
+                <a:solidFill>
+                  <a:schemeClr val="bg1"/>
+                </a:solidFill>
+                <a:prstDash val="solid"/>
+              </a:ln>
+              <a:effectLst>
+                <a:outerShdw blurRad="12700" dist="38100" dir="2700000" algn="tl" rotWithShape="0">
+                  <a:schemeClr val="bg1">
+                    <a:lumMod val="50000"/>
+                  </a:schemeClr>
+                </a:outerShdw>
+              </a:effectLst>
+            </a:endParaRPr>
+          </a:p>
+          <a:p>
+            <a:pPr marL="514350" indent="-514350">
+              <a:buAutoNum type="arabicPeriod"/>
+            </a:pPr>
+            <a:r>
+              <a:rPr lang="en-US" sz="3200" b="1" dirty="0" err="1">
+                <a:ln w="9525">
+                  <a:solidFill>
+                    <a:schemeClr val="bg1"/>
+                  </a:solidFill>
+                  <a:prstDash val="solid"/>
+                </a:ln>
+                <a:effectLst>
+                  <a:outerShdw blurRad="12700" dist="38100" dir="2700000" algn="tl" rotWithShape="0">
+                    <a:schemeClr val="bg1">
+                      <a:lumMod val="50000"/>
+                    </a:schemeClr>
+                  </a:outerShdw>
+                </a:effectLst>
+              </a:rPr>
+              <a:t>RubyPython</a:t>
+            </a:r>
+            <a:endParaRPr lang="en-US" sz="3200" b="1" dirty="0">
+              <a:ln w="9525">
+                <a:solidFill>
+                  <a:schemeClr val="bg1"/>
+                </a:solidFill>
+                <a:prstDash val="solid"/>
+              </a:ln>
+              <a:effectLst>
+                <a:outerShdw blurRad="12700" dist="38100" dir="2700000" algn="tl" rotWithShape="0">
+                  <a:schemeClr val="bg1">
+                    <a:lumMod val="50000"/>
+                  </a:schemeClr>
+                </a:outerShdw>
+              </a:effectLst>
+            </a:endParaRPr>
+          </a:p>
+          <a:p>
+            <a:pPr marL="514350" indent="-514350">
+              <a:buAutoNum type="arabicPeriod"/>
+            </a:pPr>
+            <a:r>
+              <a:rPr lang="en-US" sz="3200" b="1" dirty="0" err="1">
+                <a:ln w="9525">
+                  <a:solidFill>
+                    <a:schemeClr val="bg1"/>
+                  </a:solidFill>
+                  <a:prstDash val="solid"/>
+                </a:ln>
+                <a:effectLst>
+                  <a:outerShdw blurRad="12700" dist="38100" dir="2700000" algn="tl" rotWithShape="0">
+                    <a:schemeClr val="bg1">
+                      <a:lumMod val="50000"/>
+                    </a:schemeClr>
+                  </a:outerShdw>
+                </a:effectLst>
+              </a:rPr>
+              <a:t>PyPy</a:t>
+            </a:r>
+            <a:endParaRPr lang="en-US" sz="3200" b="1" dirty="0">
+              <a:ln w="9525">
+                <a:solidFill>
+                  <a:schemeClr val="bg1"/>
+                </a:solidFill>
+                <a:prstDash val="solid"/>
+              </a:ln>
+              <a:effectLst>
+                <a:outerShdw blurRad="12700" dist="38100" dir="2700000" algn="tl" rotWithShape="0">
+                  <a:schemeClr val="bg1">
+                    <a:lumMod val="50000"/>
+                  </a:schemeClr>
+                </a:outerShdw>
+              </a:effectLst>
+            </a:endParaRPr>
+          </a:p>
+          <a:p>
+            <a:pPr marL="514350" indent="-514350">
+              <a:buAutoNum type="arabicPeriod"/>
+            </a:pPr>
+            <a:r>
+              <a:rPr lang="en-US" sz="3200" b="1" dirty="0" err="1">
+                <a:ln w="9525">
+                  <a:solidFill>
+                    <a:schemeClr val="bg1"/>
+                  </a:solidFill>
+                  <a:prstDash val="solid"/>
+                </a:ln>
+                <a:effectLst>
+                  <a:outerShdw blurRad="12700" dist="38100" dir="2700000" algn="tl" rotWithShape="0">
+                    <a:schemeClr val="bg1">
+                      <a:lumMod val="50000"/>
+                    </a:schemeClr>
+                  </a:outerShdw>
+                </a:effectLst>
+              </a:rPr>
+              <a:t>MicroPython</a:t>
+            </a:r>
+            <a:endParaRPr lang="en-US" sz="3200" b="1" dirty="0">
+              <a:ln w="9525">
+                <a:solidFill>
+                  <a:schemeClr val="bg1"/>
+                </a:solidFill>
+                <a:prstDash val="solid"/>
+              </a:ln>
+              <a:effectLst>
+                <a:outerShdw blurRad="12700" dist="38100" dir="2700000" algn="tl" rotWithShape="0">
+                  <a:schemeClr val="bg1">
+                    <a:lumMod val="50000"/>
+                  </a:schemeClr>
+                </a:outerShdw>
+              </a:effectLst>
+            </a:endParaRPr>
+          </a:p>
+        </p:txBody>
+      </p:sp>
+    </p:spTree>
+    <p:extLst>
+      <p:ext uri="{BB962C8B-B14F-4D97-AF65-F5344CB8AC3E}">
+        <p14:creationId xmlns:p14="http://schemas.microsoft.com/office/powerpoint/2010/main" val="1843559306"/>
+      </p:ext>
+    </p:extLst>
+  </p:cSld>
+  <p:clrMapOvr>
+    <a:masterClrMapping/>
+  </p:clrMapOvr>
+</p:sld>
+</file>
+
 <file path=ppt/theme/theme1.xml><?xml version="1.0" encoding="utf-8"?>
 <a:theme xmlns:a="http://schemas.openxmlformats.org/drawingml/2006/main" name="Ion">
   <a:themeElements>

</xml_diff>

<commit_message>
added vs code tut
</commit_message>
<xml_diff>
--- a/Python/powerpoint resources/Python facts and memes.pptx
+++ b/Python/powerpoint resources/Python facts and memes.pptx
@@ -9,6 +9,8 @@
     <p:sldId id="257" r:id="rId3"/>
     <p:sldId id="258" r:id="rId4"/>
     <p:sldId id="259" r:id="rId5"/>
+    <p:sldId id="260" r:id="rId6"/>
+    <p:sldId id="261" r:id="rId7"/>
   </p:sldIdLst>
   <p:sldSz cx="12192000" cy="6858000"/>
   <p:notesSz cx="6858000" cy="9144000"/>
@@ -301,7 +303,7 @@
           <a:p>
             <a:fld id="{21C3DA2F-1200-4536-AA7B-24FE770184C7}" type="datetimeFigureOut">
               <a:rPr lang="en-US" smtClean="0"/>
-              <a:t>4/16/2024</a:t>
+              <a:t>5/9/2024</a:t>
             </a:fld>
             <a:endParaRPr lang="en-US"/>
           </a:p>
@@ -576,7 +578,7 @@
           <a:p>
             <a:fld id="{21C3DA2F-1200-4536-AA7B-24FE770184C7}" type="datetimeFigureOut">
               <a:rPr lang="en-US" smtClean="0"/>
-              <a:t>4/16/2024</a:t>
+              <a:t>5/9/2024</a:t>
             </a:fld>
             <a:endParaRPr lang="en-US"/>
           </a:p>
@@ -770,7 +772,7 @@
           <a:p>
             <a:fld id="{21C3DA2F-1200-4536-AA7B-24FE770184C7}" type="datetimeFigureOut">
               <a:rPr lang="en-US" smtClean="0"/>
-              <a:t>4/16/2024</a:t>
+              <a:t>5/9/2024</a:t>
             </a:fld>
             <a:endParaRPr lang="en-US"/>
           </a:p>
@@ -1043,7 +1045,7 @@
           <a:p>
             <a:fld id="{21C3DA2F-1200-4536-AA7B-24FE770184C7}" type="datetimeFigureOut">
               <a:rPr lang="en-US" smtClean="0"/>
-              <a:t>4/16/2024</a:t>
+              <a:t>5/9/2024</a:t>
             </a:fld>
             <a:endParaRPr lang="en-US"/>
           </a:p>
@@ -1384,7 +1386,7 @@
           <a:p>
             <a:fld id="{21C3DA2F-1200-4536-AA7B-24FE770184C7}" type="datetimeFigureOut">
               <a:rPr lang="en-US" smtClean="0"/>
-              <a:t>4/16/2024</a:t>
+              <a:t>5/9/2024</a:t>
             </a:fld>
             <a:endParaRPr lang="en-US"/>
           </a:p>
@@ -2007,7 +2009,7 @@
           <a:p>
             <a:fld id="{21C3DA2F-1200-4536-AA7B-24FE770184C7}" type="datetimeFigureOut">
               <a:rPr lang="en-US" smtClean="0"/>
-              <a:t>4/16/2024</a:t>
+              <a:t>5/9/2024</a:t>
             </a:fld>
             <a:endParaRPr lang="en-US"/>
           </a:p>
@@ -2867,7 +2869,7 @@
           <a:p>
             <a:fld id="{21C3DA2F-1200-4536-AA7B-24FE770184C7}" type="datetimeFigureOut">
               <a:rPr lang="en-US" smtClean="0"/>
-              <a:t>4/16/2024</a:t>
+              <a:t>5/9/2024</a:t>
             </a:fld>
             <a:endParaRPr lang="en-US"/>
           </a:p>
@@ -3037,7 +3039,7 @@
           <a:p>
             <a:fld id="{21C3DA2F-1200-4536-AA7B-24FE770184C7}" type="datetimeFigureOut">
               <a:rPr lang="en-US" smtClean="0"/>
-              <a:t>4/16/2024</a:t>
+              <a:t>5/9/2024</a:t>
             </a:fld>
             <a:endParaRPr lang="en-US"/>
           </a:p>
@@ -3217,7 +3219,7 @@
           <a:p>
             <a:fld id="{21C3DA2F-1200-4536-AA7B-24FE770184C7}" type="datetimeFigureOut">
               <a:rPr lang="en-US" smtClean="0"/>
-              <a:t>4/16/2024</a:t>
+              <a:t>5/9/2024</a:t>
             </a:fld>
             <a:endParaRPr lang="en-US"/>
           </a:p>
@@ -3387,7 +3389,7 @@
           <a:p>
             <a:fld id="{21C3DA2F-1200-4536-AA7B-24FE770184C7}" type="datetimeFigureOut">
               <a:rPr lang="en-US" smtClean="0"/>
-              <a:t>4/16/2024</a:t>
+              <a:t>5/9/2024</a:t>
             </a:fld>
             <a:endParaRPr lang="en-US"/>
           </a:p>
@@ -3634,7 +3636,7 @@
           <a:p>
             <a:fld id="{21C3DA2F-1200-4536-AA7B-24FE770184C7}" type="datetimeFigureOut">
               <a:rPr lang="en-US" smtClean="0"/>
-              <a:t>4/16/2024</a:t>
+              <a:t>5/9/2024</a:t>
             </a:fld>
             <a:endParaRPr lang="en-US"/>
           </a:p>
@@ -3926,7 +3928,7 @@
           <a:p>
             <a:fld id="{21C3DA2F-1200-4536-AA7B-24FE770184C7}" type="datetimeFigureOut">
               <a:rPr lang="en-US" smtClean="0"/>
-              <a:t>4/16/2024</a:t>
+              <a:t>5/9/2024</a:t>
             </a:fld>
             <a:endParaRPr lang="en-US"/>
           </a:p>
@@ -4370,7 +4372,7 @@
           <a:p>
             <a:fld id="{21C3DA2F-1200-4536-AA7B-24FE770184C7}" type="datetimeFigureOut">
               <a:rPr lang="en-US" smtClean="0"/>
-              <a:t>4/16/2024</a:t>
+              <a:t>5/9/2024</a:t>
             </a:fld>
             <a:endParaRPr lang="en-US"/>
           </a:p>
@@ -4488,7 +4490,7 @@
           <a:p>
             <a:fld id="{21C3DA2F-1200-4536-AA7B-24FE770184C7}" type="datetimeFigureOut">
               <a:rPr lang="en-US" smtClean="0"/>
-              <a:t>4/16/2024</a:t>
+              <a:t>5/9/2024</a:t>
             </a:fld>
             <a:endParaRPr lang="en-US"/>
           </a:p>
@@ -4583,7 +4585,7 @@
           <a:p>
             <a:fld id="{21C3DA2F-1200-4536-AA7B-24FE770184C7}" type="datetimeFigureOut">
               <a:rPr lang="en-US" smtClean="0"/>
-              <a:t>4/16/2024</a:t>
+              <a:t>5/9/2024</a:t>
             </a:fld>
             <a:endParaRPr lang="en-US"/>
           </a:p>
@@ -4862,7 +4864,7 @@
           <a:p>
             <a:fld id="{21C3DA2F-1200-4536-AA7B-24FE770184C7}" type="datetimeFigureOut">
               <a:rPr lang="en-US" smtClean="0"/>
-              <a:t>4/16/2024</a:t>
+              <a:t>5/9/2024</a:t>
             </a:fld>
             <a:endParaRPr lang="en-US"/>
           </a:p>
@@ -5137,7 +5139,7 @@
           <a:p>
             <a:fld id="{21C3DA2F-1200-4536-AA7B-24FE770184C7}" type="datetimeFigureOut">
               <a:rPr lang="en-US" smtClean="0"/>
-              <a:t>4/16/2024</a:t>
+              <a:t>5/9/2024</a:t>
             </a:fld>
             <a:endParaRPr lang="en-US"/>
           </a:p>
@@ -5566,7 +5568,7 @@
           <a:p>
             <a:fld id="{21C3DA2F-1200-4536-AA7B-24FE770184C7}" type="datetimeFigureOut">
               <a:rPr lang="en-US" smtClean="0"/>
-              <a:t>4/16/2024</a:t>
+              <a:t>5/9/2024</a:t>
             </a:fld>
             <a:endParaRPr lang="en-US"/>
           </a:p>
@@ -6939,6 +6941,282 @@
 </p:sld>
 </file>
 
+<file path=ppt/slides/slide5.xml><?xml version="1.0" encoding="utf-8"?>
+<p:sld xmlns:a="http://schemas.openxmlformats.org/drawingml/2006/main" xmlns:r="http://schemas.openxmlformats.org/officeDocument/2006/relationships" xmlns:p="http://schemas.openxmlformats.org/presentationml/2006/main">
+  <p:cSld>
+    <p:spTree>
+      <p:nvGrpSpPr>
+        <p:cNvPr id="1" name=""/>
+        <p:cNvGrpSpPr/>
+        <p:nvPr/>
+      </p:nvGrpSpPr>
+      <p:grpSpPr>
+        <a:xfrm>
+          <a:off x="0" y="0"/>
+          <a:ext cx="0" cy="0"/>
+          <a:chOff x="0" y="0"/>
+          <a:chExt cx="0" cy="0"/>
+        </a:xfrm>
+      </p:grpSpPr>
+      <p:pic>
+        <p:nvPicPr>
+          <p:cNvPr id="3" name="Picture 2">
+            <a:extLst>
+              <a:ext uri="{FF2B5EF4-FFF2-40B4-BE49-F238E27FC236}">
+                <a16:creationId xmlns:a16="http://schemas.microsoft.com/office/drawing/2014/main" id="{DF311CBD-FC54-4195-AD9E-3292A6051536}"/>
+              </a:ext>
+            </a:extLst>
+          </p:cNvPr>
+          <p:cNvPicPr>
+            <a:picLocks noChangeAspect="1"/>
+          </p:cNvPicPr>
+          <p:nvPr/>
+        </p:nvPicPr>
+        <p:blipFill>
+          <a:blip r:embed="rId2">
+            <a:extLst>
+              <a:ext uri="{28A0092B-C50C-407E-A947-70E740481C1C}">
+                <a14:useLocalDpi xmlns:a14="http://schemas.microsoft.com/office/drawing/2010/main" val="0"/>
+              </a:ext>
+            </a:extLst>
+          </a:blip>
+          <a:stretch>
+            <a:fillRect/>
+          </a:stretch>
+        </p:blipFill>
+        <p:spPr>
+          <a:xfrm>
+            <a:off x="776074" y="666206"/>
+            <a:ext cx="10639852" cy="5760720"/>
+          </a:xfrm>
+          <a:prstGeom prst="rect">
+            <a:avLst/>
+          </a:prstGeom>
+        </p:spPr>
+      </p:pic>
+    </p:spTree>
+    <p:extLst>
+      <p:ext uri="{BB962C8B-B14F-4D97-AF65-F5344CB8AC3E}">
+        <p14:creationId xmlns:p14="http://schemas.microsoft.com/office/powerpoint/2010/main" val="4140409155"/>
+      </p:ext>
+    </p:extLst>
+  </p:cSld>
+  <p:clrMapOvr>
+    <a:masterClrMapping/>
+  </p:clrMapOvr>
+</p:sld>
+</file>
+
+<file path=ppt/slides/slide6.xml><?xml version="1.0" encoding="utf-8"?>
+<p:sld xmlns:a="http://schemas.openxmlformats.org/drawingml/2006/main" xmlns:r="http://schemas.openxmlformats.org/officeDocument/2006/relationships" xmlns:p="http://schemas.openxmlformats.org/presentationml/2006/main">
+  <p:cSld>
+    <p:spTree>
+      <p:nvGrpSpPr>
+        <p:cNvPr id="1" name=""/>
+        <p:cNvGrpSpPr/>
+        <p:nvPr/>
+      </p:nvGrpSpPr>
+      <p:grpSpPr>
+        <a:xfrm>
+          <a:off x="0" y="0"/>
+          <a:ext cx="0" cy="0"/>
+          <a:chOff x="0" y="0"/>
+          <a:chExt cx="0" cy="0"/>
+        </a:xfrm>
+      </p:grpSpPr>
+      <p:sp>
+        <p:nvSpPr>
+          <p:cNvPr id="2" name="Rectangle 1">
+            <a:extLst>
+              <a:ext uri="{FF2B5EF4-FFF2-40B4-BE49-F238E27FC236}">
+                <a16:creationId xmlns:a16="http://schemas.microsoft.com/office/drawing/2014/main" id="{4B2ED4F1-7786-446E-BBD7-FE5317354855}"/>
+              </a:ext>
+            </a:extLst>
+          </p:cNvPr>
+          <p:cNvSpPr/>
+          <p:nvPr/>
+        </p:nvSpPr>
+        <p:spPr>
+          <a:xfrm>
+            <a:off x="3567546" y="424552"/>
+            <a:ext cx="4480715" cy="923330"/>
+          </a:xfrm>
+          <a:prstGeom prst="rect">
+            <a:avLst/>
+          </a:prstGeom>
+          <a:noFill/>
+        </p:spPr>
+        <p:txBody>
+          <a:bodyPr wrap="none" lIns="91440" tIns="45720" rIns="91440" bIns="45720">
+            <a:spAutoFit/>
+          </a:bodyPr>
+          <a:lstStyle/>
+          <a:p>
+            <a:pPr algn="ctr"/>
+            <a:r>
+              <a:rPr lang="en-US" sz="5400" b="1" cap="none" spc="0" dirty="0">
+                <a:ln w="9525">
+                  <a:solidFill>
+                    <a:schemeClr val="bg1"/>
+                  </a:solidFill>
+                  <a:prstDash val="solid"/>
+                </a:ln>
+                <a:solidFill>
+                  <a:schemeClr val="tx1"/>
+                </a:solidFill>
+                <a:effectLst>
+                  <a:outerShdw blurRad="12700" dist="38100" dir="2700000" algn="tl" rotWithShape="0">
+                    <a:schemeClr val="bg1">
+                      <a:lumMod val="50000"/>
+                    </a:schemeClr>
+                  </a:outerShdw>
+                </a:effectLst>
+              </a:rPr>
+              <a:t>Python Fact!!</a:t>
+            </a:r>
+          </a:p>
+        </p:txBody>
+      </p:sp>
+      <p:sp>
+        <p:nvSpPr>
+          <p:cNvPr id="4" name="Rectangle 3">
+            <a:extLst>
+              <a:ext uri="{FF2B5EF4-FFF2-40B4-BE49-F238E27FC236}">
+                <a16:creationId xmlns:a16="http://schemas.microsoft.com/office/drawing/2014/main" id="{660A8B3D-9799-4E4B-BCE8-4DEAC9B8BC05}"/>
+              </a:ext>
+            </a:extLst>
+          </p:cNvPr>
+          <p:cNvSpPr/>
+          <p:nvPr/>
+        </p:nvSpPr>
+        <p:spPr>
+          <a:xfrm>
+            <a:off x="1215451" y="1728890"/>
+            <a:ext cx="6115777" cy="369332"/>
+          </a:xfrm>
+          <a:prstGeom prst="rect">
+            <a:avLst/>
+          </a:prstGeom>
+          <a:noFill/>
+        </p:spPr>
+        <p:txBody>
+          <a:bodyPr wrap="none" lIns="91440" tIns="45720" rIns="91440" bIns="45720">
+            <a:spAutoFit/>
+          </a:bodyPr>
+          <a:lstStyle/>
+          <a:p>
+            <a:pPr marL="0" algn="l" rtl="0" eaLnBrk="1" fontAlgn="base" latinLnBrk="0" hangingPunct="1">
+              <a:spcBef>
+                <a:spcPts val="0"/>
+              </a:spcBef>
+              <a:spcAft>
+                <a:spcPts val="0"/>
+              </a:spcAft>
+            </a:pPr>
+            <a:r>
+              <a:rPr lang="en-US" sz="1800" b="1" i="0" kern="1200" dirty="0">
+                <a:solidFill>
+                  <a:srgbClr val="FFFFFF"/>
+                </a:solidFill>
+                <a:effectLst/>
+                <a:latin typeface="Lora" pitchFamily="2" charset="0"/>
+                <a:ea typeface="+mn-ea"/>
+                <a:cs typeface="+mn-cs"/>
+              </a:rPr>
+              <a:t>3. Python Has One of the Largest Community Support</a:t>
+            </a:r>
+            <a:endParaRPr lang="en-US" sz="2800" dirty="0">
+              <a:effectLst/>
+            </a:endParaRPr>
+          </a:p>
+        </p:txBody>
+      </p:sp>
+      <p:sp>
+        <p:nvSpPr>
+          <p:cNvPr id="6" name="Rectangle 5">
+            <a:extLst>
+              <a:ext uri="{FF2B5EF4-FFF2-40B4-BE49-F238E27FC236}">
+                <a16:creationId xmlns:a16="http://schemas.microsoft.com/office/drawing/2014/main" id="{6BCA6AA8-6752-4175-B37D-ABE369492A91}"/>
+              </a:ext>
+            </a:extLst>
+          </p:cNvPr>
+          <p:cNvSpPr/>
+          <p:nvPr/>
+        </p:nvSpPr>
+        <p:spPr>
+          <a:xfrm>
+            <a:off x="1485417" y="2233010"/>
+            <a:ext cx="8990994" cy="3785652"/>
+          </a:xfrm>
+          <a:prstGeom prst="rect">
+            <a:avLst/>
+          </a:prstGeom>
+          <a:noFill/>
+        </p:spPr>
+        <p:txBody>
+          <a:bodyPr wrap="square" lIns="91440" tIns="45720" rIns="91440" bIns="45720">
+            <a:spAutoFit/>
+          </a:bodyPr>
+          <a:lstStyle/>
+          <a:p>
+            <a:pPr marL="0" algn="l" rtl="0" eaLnBrk="1" fontAlgn="base" latinLnBrk="0" hangingPunct="1">
+              <a:spcBef>
+                <a:spcPts val="0"/>
+              </a:spcBef>
+              <a:spcAft>
+                <a:spcPts val="0"/>
+              </a:spcAft>
+            </a:pPr>
+            <a:r>
+              <a:rPr lang="en-US" sz="2400" b="0" i="0" kern="1200" dirty="0">
+                <a:effectLst/>
+                <a:latin typeface="Lato" panose="020F0502020204030203" pitchFamily="34" charset="0"/>
+                <a:ea typeface="+mn-ea"/>
+                <a:cs typeface="+mn-cs"/>
+              </a:rPr>
+              <a:t>Python has one of the largest community support systems in the programming world. The vast network of Python users consists of people from various platforms. There are many online tutorials, notes, and resources available for free. It makes it easier for new programmers to learn from the best resources. </a:t>
+            </a:r>
+            <a:endParaRPr lang="en-US" sz="2400" dirty="0">
+              <a:effectLst/>
+            </a:endParaRPr>
+          </a:p>
+          <a:p>
+            <a:pPr marL="0" algn="l" rtl="0" eaLnBrk="1" fontAlgn="base" latinLnBrk="0" hangingPunct="1">
+              <a:spcBef>
+                <a:spcPts val="0"/>
+              </a:spcBef>
+              <a:spcAft>
+                <a:spcPts val="0"/>
+              </a:spcAft>
+            </a:pPr>
+            <a:r>
+              <a:rPr lang="en-US" sz="2400" b="0" i="0" kern="1200" dirty="0">
+                <a:effectLst/>
+                <a:latin typeface="Lato" panose="020F0502020204030203" pitchFamily="34" charset="0"/>
+                <a:ea typeface="+mn-ea"/>
+                <a:cs typeface="+mn-cs"/>
+              </a:rPr>
+              <a:t>The vast community also offers help whenever someone is struggling with doubt. They also contribute to open-source projects. This extensive support makes sure that people everywhere can find proper assistance, share ideas, and collaborate openly on projects. </a:t>
+            </a:r>
+            <a:endParaRPr lang="en-US" sz="2400" dirty="0">
+              <a:effectLst/>
+            </a:endParaRPr>
+          </a:p>
+        </p:txBody>
+      </p:sp>
+    </p:spTree>
+    <p:extLst>
+      <p:ext uri="{BB962C8B-B14F-4D97-AF65-F5344CB8AC3E}">
+        <p14:creationId xmlns:p14="http://schemas.microsoft.com/office/powerpoint/2010/main" val="3566338472"/>
+      </p:ext>
+    </p:extLst>
+  </p:cSld>
+  <p:clrMapOvr>
+    <a:masterClrMapping/>
+  </p:clrMapOvr>
+</p:sld>
+</file>
+
 <file path=ppt/theme/theme1.xml><?xml version="1.0" encoding="utf-8"?>
 <a:theme xmlns:a="http://schemas.openxmlformats.org/drawingml/2006/main" name="Ion">
   <a:themeElements>

</xml_diff>

<commit_message>
lect 10 and image zoom
</commit_message>
<xml_diff>
--- a/Python/powerpoint resources/Python facts and memes.pptx
+++ b/Python/powerpoint resources/Python facts and memes.pptx
@@ -11,6 +11,8 @@
     <p:sldId id="259" r:id="rId5"/>
     <p:sldId id="260" r:id="rId6"/>
     <p:sldId id="261" r:id="rId7"/>
+    <p:sldId id="262" r:id="rId8"/>
+    <p:sldId id="263" r:id="rId9"/>
   </p:sldIdLst>
   <p:sldSz cx="12192000" cy="6858000"/>
   <p:notesSz cx="6858000" cy="9144000"/>
@@ -303,7 +305,7 @@
           <a:p>
             <a:fld id="{21C3DA2F-1200-4536-AA7B-24FE770184C7}" type="datetimeFigureOut">
               <a:rPr lang="en-US" smtClean="0"/>
-              <a:t>5/9/2024</a:t>
+              <a:t>5/18/2024</a:t>
             </a:fld>
             <a:endParaRPr lang="en-US"/>
           </a:p>
@@ -578,7 +580,7 @@
           <a:p>
             <a:fld id="{21C3DA2F-1200-4536-AA7B-24FE770184C7}" type="datetimeFigureOut">
               <a:rPr lang="en-US" smtClean="0"/>
-              <a:t>5/9/2024</a:t>
+              <a:t>5/18/2024</a:t>
             </a:fld>
             <a:endParaRPr lang="en-US"/>
           </a:p>
@@ -772,7 +774,7 @@
           <a:p>
             <a:fld id="{21C3DA2F-1200-4536-AA7B-24FE770184C7}" type="datetimeFigureOut">
               <a:rPr lang="en-US" smtClean="0"/>
-              <a:t>5/9/2024</a:t>
+              <a:t>5/18/2024</a:t>
             </a:fld>
             <a:endParaRPr lang="en-US"/>
           </a:p>
@@ -1045,7 +1047,7 @@
           <a:p>
             <a:fld id="{21C3DA2F-1200-4536-AA7B-24FE770184C7}" type="datetimeFigureOut">
               <a:rPr lang="en-US" smtClean="0"/>
-              <a:t>5/9/2024</a:t>
+              <a:t>5/18/2024</a:t>
             </a:fld>
             <a:endParaRPr lang="en-US"/>
           </a:p>
@@ -1386,7 +1388,7 @@
           <a:p>
             <a:fld id="{21C3DA2F-1200-4536-AA7B-24FE770184C7}" type="datetimeFigureOut">
               <a:rPr lang="en-US" smtClean="0"/>
-              <a:t>5/9/2024</a:t>
+              <a:t>5/18/2024</a:t>
             </a:fld>
             <a:endParaRPr lang="en-US"/>
           </a:p>
@@ -2009,7 +2011,7 @@
           <a:p>
             <a:fld id="{21C3DA2F-1200-4536-AA7B-24FE770184C7}" type="datetimeFigureOut">
               <a:rPr lang="en-US" smtClean="0"/>
-              <a:t>5/9/2024</a:t>
+              <a:t>5/18/2024</a:t>
             </a:fld>
             <a:endParaRPr lang="en-US"/>
           </a:p>
@@ -2869,7 +2871,7 @@
           <a:p>
             <a:fld id="{21C3DA2F-1200-4536-AA7B-24FE770184C7}" type="datetimeFigureOut">
               <a:rPr lang="en-US" smtClean="0"/>
-              <a:t>5/9/2024</a:t>
+              <a:t>5/18/2024</a:t>
             </a:fld>
             <a:endParaRPr lang="en-US"/>
           </a:p>
@@ -3039,7 +3041,7 @@
           <a:p>
             <a:fld id="{21C3DA2F-1200-4536-AA7B-24FE770184C7}" type="datetimeFigureOut">
               <a:rPr lang="en-US" smtClean="0"/>
-              <a:t>5/9/2024</a:t>
+              <a:t>5/18/2024</a:t>
             </a:fld>
             <a:endParaRPr lang="en-US"/>
           </a:p>
@@ -3219,7 +3221,7 @@
           <a:p>
             <a:fld id="{21C3DA2F-1200-4536-AA7B-24FE770184C7}" type="datetimeFigureOut">
               <a:rPr lang="en-US" smtClean="0"/>
-              <a:t>5/9/2024</a:t>
+              <a:t>5/18/2024</a:t>
             </a:fld>
             <a:endParaRPr lang="en-US"/>
           </a:p>
@@ -3389,7 +3391,7 @@
           <a:p>
             <a:fld id="{21C3DA2F-1200-4536-AA7B-24FE770184C7}" type="datetimeFigureOut">
               <a:rPr lang="en-US" smtClean="0"/>
-              <a:t>5/9/2024</a:t>
+              <a:t>5/18/2024</a:t>
             </a:fld>
             <a:endParaRPr lang="en-US"/>
           </a:p>
@@ -3636,7 +3638,7 @@
           <a:p>
             <a:fld id="{21C3DA2F-1200-4536-AA7B-24FE770184C7}" type="datetimeFigureOut">
               <a:rPr lang="en-US" smtClean="0"/>
-              <a:t>5/9/2024</a:t>
+              <a:t>5/18/2024</a:t>
             </a:fld>
             <a:endParaRPr lang="en-US"/>
           </a:p>
@@ -3928,7 +3930,7 @@
           <a:p>
             <a:fld id="{21C3DA2F-1200-4536-AA7B-24FE770184C7}" type="datetimeFigureOut">
               <a:rPr lang="en-US" smtClean="0"/>
-              <a:t>5/9/2024</a:t>
+              <a:t>5/18/2024</a:t>
             </a:fld>
             <a:endParaRPr lang="en-US"/>
           </a:p>
@@ -4372,7 +4374,7 @@
           <a:p>
             <a:fld id="{21C3DA2F-1200-4536-AA7B-24FE770184C7}" type="datetimeFigureOut">
               <a:rPr lang="en-US" smtClean="0"/>
-              <a:t>5/9/2024</a:t>
+              <a:t>5/18/2024</a:t>
             </a:fld>
             <a:endParaRPr lang="en-US"/>
           </a:p>
@@ -4490,7 +4492,7 @@
           <a:p>
             <a:fld id="{21C3DA2F-1200-4536-AA7B-24FE770184C7}" type="datetimeFigureOut">
               <a:rPr lang="en-US" smtClean="0"/>
-              <a:t>5/9/2024</a:t>
+              <a:t>5/18/2024</a:t>
             </a:fld>
             <a:endParaRPr lang="en-US"/>
           </a:p>
@@ -4585,7 +4587,7 @@
           <a:p>
             <a:fld id="{21C3DA2F-1200-4536-AA7B-24FE770184C7}" type="datetimeFigureOut">
               <a:rPr lang="en-US" smtClean="0"/>
-              <a:t>5/9/2024</a:t>
+              <a:t>5/18/2024</a:t>
             </a:fld>
             <a:endParaRPr lang="en-US"/>
           </a:p>
@@ -4864,7 +4866,7 @@
           <a:p>
             <a:fld id="{21C3DA2F-1200-4536-AA7B-24FE770184C7}" type="datetimeFigureOut">
               <a:rPr lang="en-US" smtClean="0"/>
-              <a:t>5/9/2024</a:t>
+              <a:t>5/18/2024</a:t>
             </a:fld>
             <a:endParaRPr lang="en-US"/>
           </a:p>
@@ -5139,7 +5141,7 @@
           <a:p>
             <a:fld id="{21C3DA2F-1200-4536-AA7B-24FE770184C7}" type="datetimeFigureOut">
               <a:rPr lang="en-US" smtClean="0"/>
-              <a:t>5/9/2024</a:t>
+              <a:t>5/18/2024</a:t>
             </a:fld>
             <a:endParaRPr lang="en-US"/>
           </a:p>
@@ -5568,7 +5570,7 @@
           <a:p>
             <a:fld id="{21C3DA2F-1200-4536-AA7B-24FE770184C7}" type="datetimeFigureOut">
               <a:rPr lang="en-US" smtClean="0"/>
-              <a:t>5/9/2024</a:t>
+              <a:t>5/18/2024</a:t>
             </a:fld>
             <a:endParaRPr lang="en-US"/>
           </a:p>
@@ -7123,7 +7125,7 @@
                 <a:ea typeface="+mn-ea"/>
                 <a:cs typeface="+mn-cs"/>
               </a:rPr>
-              <a:t>3. Python Has One of the Largest Community Support</a:t>
+              <a:t> Python Has One of the Largest Community Support</a:t>
             </a:r>
             <a:endParaRPr lang="en-US" sz="2800" dirty="0">
               <a:effectLst/>
@@ -7208,6 +7210,256 @@
     <p:extLst>
       <p:ext uri="{BB962C8B-B14F-4D97-AF65-F5344CB8AC3E}">
         <p14:creationId xmlns:p14="http://schemas.microsoft.com/office/powerpoint/2010/main" val="3566338472"/>
+      </p:ext>
+    </p:extLst>
+  </p:cSld>
+  <p:clrMapOvr>
+    <a:masterClrMapping/>
+  </p:clrMapOvr>
+</p:sld>
+</file>
+
+<file path=ppt/slides/slide7.xml><?xml version="1.0" encoding="utf-8"?>
+<p:sld xmlns:a="http://schemas.openxmlformats.org/drawingml/2006/main" xmlns:r="http://schemas.openxmlformats.org/officeDocument/2006/relationships" xmlns:p="http://schemas.openxmlformats.org/presentationml/2006/main">
+  <p:cSld>
+    <p:spTree>
+      <p:nvGrpSpPr>
+        <p:cNvPr id="1" name=""/>
+        <p:cNvGrpSpPr/>
+        <p:nvPr/>
+      </p:nvGrpSpPr>
+      <p:grpSpPr>
+        <a:xfrm>
+          <a:off x="0" y="0"/>
+          <a:ext cx="0" cy="0"/>
+          <a:chOff x="0" y="0"/>
+          <a:chExt cx="0" cy="0"/>
+        </a:xfrm>
+      </p:grpSpPr>
+      <p:pic>
+        <p:nvPicPr>
+          <p:cNvPr id="1026" name="Picture 2" descr="How Memes can help you learn Python | by Susanne van Wagensveld | Medium">
+            <a:extLst>
+              <a:ext uri="{FF2B5EF4-FFF2-40B4-BE49-F238E27FC236}">
+                <a16:creationId xmlns:a16="http://schemas.microsoft.com/office/drawing/2014/main" id="{04784BA3-41E5-4209-ACD6-160368BCED04}"/>
+              </a:ext>
+            </a:extLst>
+          </p:cNvPr>
+          <p:cNvPicPr>
+            <a:picLocks noChangeAspect="1" noChangeArrowheads="1"/>
+          </p:cNvPicPr>
+          <p:nvPr/>
+        </p:nvPicPr>
+        <p:blipFill>
+          <a:blip r:embed="rId2">
+            <a:extLst>
+              <a:ext uri="{28A0092B-C50C-407E-A947-70E740481C1C}">
+                <a14:useLocalDpi xmlns:a14="http://schemas.microsoft.com/office/drawing/2010/main" val="0"/>
+              </a:ext>
+            </a:extLst>
+          </a:blip>
+          <a:srcRect/>
+          <a:stretch>
+            <a:fillRect/>
+          </a:stretch>
+        </p:blipFill>
+        <p:spPr bwMode="auto">
+          <a:xfrm>
+            <a:off x="3635692" y="452028"/>
+            <a:ext cx="4920615" cy="5953944"/>
+          </a:xfrm>
+          <a:prstGeom prst="rect">
+            <a:avLst/>
+          </a:prstGeom>
+          <a:noFill/>
+          <a:extLst>
+            <a:ext uri="{909E8E84-426E-40DD-AFC4-6F175D3DCCD1}">
+              <a14:hiddenFill xmlns:a14="http://schemas.microsoft.com/office/drawing/2010/main">
+                <a:solidFill>
+                  <a:srgbClr val="FFFFFF"/>
+                </a:solidFill>
+              </a14:hiddenFill>
+            </a:ext>
+          </a:extLst>
+        </p:spPr>
+      </p:pic>
+    </p:spTree>
+    <p:extLst>
+      <p:ext uri="{BB962C8B-B14F-4D97-AF65-F5344CB8AC3E}">
+        <p14:creationId xmlns:p14="http://schemas.microsoft.com/office/powerpoint/2010/main" val="3188513263"/>
+      </p:ext>
+    </p:extLst>
+  </p:cSld>
+  <p:clrMapOvr>
+    <a:masterClrMapping/>
+  </p:clrMapOvr>
+</p:sld>
+</file>
+
+<file path=ppt/slides/slide8.xml><?xml version="1.0" encoding="utf-8"?>
+<p:sld xmlns:a="http://schemas.openxmlformats.org/drawingml/2006/main" xmlns:r="http://schemas.openxmlformats.org/officeDocument/2006/relationships" xmlns:p="http://schemas.openxmlformats.org/presentationml/2006/main">
+  <p:cSld>
+    <p:spTree>
+      <p:nvGrpSpPr>
+        <p:cNvPr id="1" name=""/>
+        <p:cNvGrpSpPr/>
+        <p:nvPr/>
+      </p:nvGrpSpPr>
+      <p:grpSpPr>
+        <a:xfrm>
+          <a:off x="0" y="0"/>
+          <a:ext cx="0" cy="0"/>
+          <a:chOff x="0" y="0"/>
+          <a:chExt cx="0" cy="0"/>
+        </a:xfrm>
+      </p:grpSpPr>
+      <p:sp>
+        <p:nvSpPr>
+          <p:cNvPr id="2" name="Rectangle 1">
+            <a:extLst>
+              <a:ext uri="{FF2B5EF4-FFF2-40B4-BE49-F238E27FC236}">
+                <a16:creationId xmlns:a16="http://schemas.microsoft.com/office/drawing/2014/main" id="{0E7498C5-4C2B-4EB2-BB31-986C28724C1C}"/>
+              </a:ext>
+            </a:extLst>
+          </p:cNvPr>
+          <p:cNvSpPr/>
+          <p:nvPr/>
+        </p:nvSpPr>
+        <p:spPr>
+          <a:xfrm>
+            <a:off x="3567546" y="424552"/>
+            <a:ext cx="4480715" cy="923330"/>
+          </a:xfrm>
+          <a:prstGeom prst="rect">
+            <a:avLst/>
+          </a:prstGeom>
+          <a:noFill/>
+        </p:spPr>
+        <p:txBody>
+          <a:bodyPr wrap="none" lIns="91440" tIns="45720" rIns="91440" bIns="45720">
+            <a:spAutoFit/>
+          </a:bodyPr>
+          <a:lstStyle/>
+          <a:p>
+            <a:pPr algn="ctr"/>
+            <a:r>
+              <a:rPr lang="en-US" sz="5400" b="1" cap="none" spc="0" dirty="0">
+                <a:ln w="9525">
+                  <a:solidFill>
+                    <a:schemeClr val="bg1"/>
+                  </a:solidFill>
+                  <a:prstDash val="solid"/>
+                </a:ln>
+                <a:solidFill>
+                  <a:schemeClr val="tx1"/>
+                </a:solidFill>
+                <a:effectLst>
+                  <a:outerShdw blurRad="12700" dist="38100" dir="2700000" algn="tl" rotWithShape="0">
+                    <a:schemeClr val="bg1">
+                      <a:lumMod val="50000"/>
+                    </a:schemeClr>
+                  </a:outerShdw>
+                </a:effectLst>
+              </a:rPr>
+              <a:t>Python Fact!!</a:t>
+            </a:r>
+          </a:p>
+        </p:txBody>
+      </p:sp>
+      <p:sp>
+        <p:nvSpPr>
+          <p:cNvPr id="4" name="TextBox 3">
+            <a:extLst>
+              <a:ext uri="{FF2B5EF4-FFF2-40B4-BE49-F238E27FC236}">
+                <a16:creationId xmlns:a16="http://schemas.microsoft.com/office/drawing/2014/main" id="{ABB9C361-0B7C-4F84-9B6C-A17526F13A0F}"/>
+              </a:ext>
+            </a:extLst>
+          </p:cNvPr>
+          <p:cNvSpPr txBox="1"/>
+          <p:nvPr/>
+        </p:nvSpPr>
+        <p:spPr>
+          <a:xfrm>
+            <a:off x="2390502" y="1347882"/>
+            <a:ext cx="7733211" cy="5119350"/>
+          </a:xfrm>
+          <a:prstGeom prst="rect">
+            <a:avLst/>
+          </a:prstGeom>
+          <a:noFill/>
+        </p:spPr>
+        <p:txBody>
+          <a:bodyPr wrap="square">
+            <a:spAutoFit/>
+          </a:bodyPr>
+          <a:lstStyle/>
+          <a:p>
+            <a:pPr>
+              <a:lnSpc>
+                <a:spcPct val="150000"/>
+              </a:lnSpc>
+            </a:pPr>
+            <a:r>
+              <a:rPr lang="en-US" sz="2000" b="1" i="0" u="sng" dirty="0">
+                <a:solidFill>
+                  <a:srgbClr val="FFFFFF"/>
+                </a:solidFill>
+                <a:effectLst/>
+                <a:latin typeface="Roboto" panose="02000000000000000000" pitchFamily="2" charset="0"/>
+              </a:rPr>
+              <a:t>Python was created as a hobby project</a:t>
+            </a:r>
+            <a:endParaRPr lang="en-US" sz="2000" b="0" i="0" u="sng" dirty="0">
+              <a:solidFill>
+                <a:srgbClr val="FFFFFF"/>
+              </a:solidFill>
+              <a:effectLst/>
+              <a:latin typeface="Roboto" panose="02000000000000000000" pitchFamily="2" charset="0"/>
+            </a:endParaRPr>
+          </a:p>
+          <a:p>
+            <a:pPr>
+              <a:lnSpc>
+                <a:spcPct val="150000"/>
+              </a:lnSpc>
+            </a:pPr>
+            <a:r>
+              <a:rPr lang="en-US" sz="2000" b="0" i="0" dirty="0">
+                <a:solidFill>
+                  <a:srgbClr val="FFFFFF"/>
+                </a:solidFill>
+                <a:effectLst/>
+                <a:latin typeface="Roboto" panose="02000000000000000000" pitchFamily="2" charset="0"/>
+              </a:rPr>
+              <a:t>Believe it or not, Guido van Rossum started working on Python in 1989 because his office was closed for the Christmas break and he was feeling bored at home. At the time, Guido was working at the Centrum </a:t>
+            </a:r>
+            <a:r>
+              <a:rPr lang="en-US" sz="2000" b="0" i="0" dirty="0" err="1">
+                <a:solidFill>
+                  <a:srgbClr val="FFFFFF"/>
+                </a:solidFill>
+                <a:effectLst/>
+                <a:latin typeface="Roboto" panose="02000000000000000000" pitchFamily="2" charset="0"/>
+              </a:rPr>
+              <a:t>Wiskunde</a:t>
+            </a:r>
+            <a:r>
+              <a:rPr lang="en-US" sz="2000" b="0" i="0" dirty="0">
+                <a:solidFill>
+                  <a:srgbClr val="FFFFFF"/>
+                </a:solidFill>
+                <a:effectLst/>
+                <a:latin typeface="Roboto" panose="02000000000000000000" pitchFamily="2" charset="0"/>
+              </a:rPr>
+              <a:t> &amp; Informatica (CWI) in the Netherlands. At CWI he was using the ABC programming language but found that it was lacking in some aspects. So, he decided to create a language that would be user-friendly and would fix the issues he had found in ABC. Guido drew inspiration from various programming languages, but he also gave life to his own ideas and took into account his personal preferences.</a:t>
+            </a:r>
+          </a:p>
+        </p:txBody>
+      </p:sp>
+    </p:spTree>
+    <p:extLst>
+      <p:ext uri="{BB962C8B-B14F-4D97-AF65-F5344CB8AC3E}">
+        <p14:creationId xmlns:p14="http://schemas.microsoft.com/office/powerpoint/2010/main" val="1284121296"/>
       </p:ext>
     </p:extLst>
   </p:cSld>

</xml_diff>